<commit_message>
Change presentation according to feedback
</commit_message>
<xml_diff>
--- a/presentation/1/praesentation1 (1).pptx
+++ b/presentation/1/praesentation1 (1).pptx
@@ -921,7 +921,7 @@
         <p:spPr>
           <a:xfrm>
             <a:off x="457200" y="92074"/>
-            <a:ext cx="8229600" cy="1508127"/>
+            <a:ext cx="8229600" cy="1508126"/>
           </a:xfrm>
           <a:prstGeom prst="rect">
             <a:avLst/>
@@ -929,12 +929,20 @@
           <a:ln w="12700">
             <a:miter lim="400000"/>
           </a:ln>
+          <a:extLst>
+            <a:ext uri="{C572A759-6A51-4108-AA02-DFA0A04FC94B}">
+              <ma14:wrappingTextBoxFlag xmlns:ma14="http://schemas.microsoft.com/office/mac/drawingml/2011/main" val="1"/>
+            </a:ext>
+          </a:extLst>
         </p:spPr>
         <p:txBody>
           <a:bodyPr lIns="45719" rIns="45719" anchor="ctr"/>
           <a:lstStyle/>
           <a:p>
             <a:pPr/>
+            <a:r>
+              <a:t>Title Text</a:t>
+            </a:r>
           </a:p>
         </p:txBody>
       </p:sp>
@@ -957,12 +965,44 @@
           <a:ln w="12700">
             <a:miter lim="400000"/>
           </a:ln>
+          <a:extLst>
+            <a:ext uri="{C572A759-6A51-4108-AA02-DFA0A04FC94B}">
+              <ma14:wrappingTextBoxFlag xmlns:ma14="http://schemas.microsoft.com/office/mac/drawingml/2011/main" val="1"/>
+            </a:ext>
+          </a:extLst>
         </p:spPr>
         <p:txBody>
           <a:bodyPr lIns="45719" rIns="45719"/>
           <a:lstStyle/>
           <a:p>
             <a:pPr/>
+            <a:r>
+              <a:t>Body Level One</a:t>
+            </a:r>
+          </a:p>
+          <a:p>
+            <a:pPr lvl="1"/>
+            <a:r>
+              <a:t>Body Level Two</a:t>
+            </a:r>
+          </a:p>
+          <a:p>
+            <a:pPr lvl="2"/>
+            <a:r>
+              <a:t>Body Level Three</a:t>
+            </a:r>
+          </a:p>
+          <a:p>
+            <a:pPr lvl="3"/>
+            <a:r>
+              <a:t>Body Level Four</a:t>
+            </a:r>
+          </a:p>
+          <a:p>
+            <a:pPr lvl="4"/>
+            <a:r>
+              <a:t>Body Level Five</a:t>
+            </a:r>
           </a:p>
         </p:txBody>
       </p:sp>
@@ -1819,11 +1859,6 @@
           <a:prstGeom prst="rect">
             <a:avLst/>
           </a:prstGeom>
-          <a:extLst>
-            <a:ext uri="{C572A759-6A51-4108-AA02-DFA0A04FC94B}">
-              <ma14:wrappingTextBoxFlag xmlns:ma14="http://schemas.microsoft.com/office/mac/drawingml/2011/main" val="1"/>
-            </a:ext>
-          </a:extLst>
         </p:spPr>
         <p:txBody>
           <a:bodyPr>
@@ -1844,7 +1879,7 @@
           <a:p>
             <a:pPr/>
             <a:r>
-              <a:t>RoboCup</a:t>
+              <a:t>RoboCup Simulation League</a:t>
             </a:r>
           </a:p>
         </p:txBody>
@@ -1865,11 +1900,6 @@
           <a:prstGeom prst="rect">
             <a:avLst/>
           </a:prstGeom>
-          <a:extLst>
-            <a:ext uri="{C572A759-6A51-4108-AA02-DFA0A04FC94B}">
-              <ma14:wrappingTextBoxFlag xmlns:ma14="http://schemas.microsoft.com/office/mac/drawingml/2011/main" val="1"/>
-            </a:ext>
-          </a:extLst>
         </p:spPr>
         <p:txBody>
           <a:bodyPr>
@@ -2004,11 +2034,6 @@
           <a:prstGeom prst="rect">
             <a:avLst/>
           </a:prstGeom>
-          <a:extLst>
-            <a:ext uri="{C572A759-6A51-4108-AA02-DFA0A04FC94B}">
-              <ma14:wrappingTextBoxFlag xmlns:ma14="http://schemas.microsoft.com/office/mac/drawingml/2011/main" val="1"/>
-            </a:ext>
-          </a:extLst>
         </p:spPr>
         <p:txBody>
           <a:bodyPr>
@@ -2072,7 +2097,7 @@
         </p:blipFill>
         <p:spPr>
           <a:xfrm>
-            <a:off x="4657748" y="2102085"/>
+            <a:off x="314348" y="1505185"/>
             <a:ext cx="4237850" cy="2653830"/>
           </a:xfrm>
           <a:prstGeom prst="rect">
@@ -2101,7 +2126,7 @@
         </p:blipFill>
         <p:spPr>
           <a:xfrm>
-            <a:off x="436654" y="2102085"/>
+            <a:off x="4868954" y="1505185"/>
             <a:ext cx="3957891" cy="2653830"/>
           </a:xfrm>
           <a:prstGeom prst="rect">
@@ -2112,6 +2137,46 @@
           </a:ln>
         </p:spPr>
       </p:pic>
+      <p:sp>
+        <p:nvSpPr>
+          <p:cNvPr id="42" name="Shape 42"/>
+          <p:cNvSpPr/>
+          <p:nvPr>
+            <p:ph type="body" idx="4294967295"/>
+          </p:nvPr>
+        </p:nvSpPr>
+        <p:spPr>
+          <a:xfrm>
+            <a:off x="457200" y="4741862"/>
+            <a:ext cx="8229600" cy="4525963"/>
+          </a:xfrm>
+          <a:prstGeom prst="rect">
+            <a:avLst/>
+          </a:prstGeom>
+        </p:spPr>
+        <p:txBody>
+          <a:bodyPr>
+            <a:normAutofit fontScale="100000" lnSpcReduction="0"/>
+          </a:bodyPr>
+          <a:lstStyle/>
+          <a:p>
+            <a:pPr>
+              <a:buChar char="▪"/>
+            </a:pPr>
+            <a:r>
+              <a:t>Jährlich ausgetragen</a:t>
+            </a:r>
+          </a:p>
+          <a:p>
+            <a:pPr>
+              <a:buChar char="▪"/>
+            </a:pPr>
+            <a:r>
+              <a:t>Verschiedene Ligen</a:t>
+            </a:r>
+          </a:p>
+        </p:txBody>
+      </p:sp>
     </p:spTree>
   </p:cSld>
   <p:clrMapOvr>
@@ -2140,7 +2205,7 @@
       </p:grpSpPr>
       <p:sp>
         <p:nvSpPr>
-          <p:cNvPr id="43" name="Shape 43"/>
+          <p:cNvPr id="44" name="Shape 44"/>
           <p:cNvSpPr/>
           <p:nvPr>
             <p:ph type="sldNum" sz="quarter" idx="2"/>
@@ -2171,7 +2236,7 @@
       </p:sp>
       <p:sp>
         <p:nvSpPr>
-          <p:cNvPr id="44" name="Shape 44"/>
+          <p:cNvPr id="45" name="Shape 45"/>
           <p:cNvSpPr/>
           <p:nvPr>
             <p:ph type="body" idx="4294967295"/>
@@ -2179,17 +2244,12 @@
         </p:nvSpPr>
         <p:spPr>
           <a:xfrm>
-            <a:off x="457200" y="1600200"/>
+            <a:off x="457200" y="3860800"/>
             <a:ext cx="8229600" cy="4525963"/>
           </a:xfrm>
           <a:prstGeom prst="rect">
             <a:avLst/>
           </a:prstGeom>
-          <a:extLst>
-            <a:ext uri="{C572A759-6A51-4108-AA02-DFA0A04FC94B}">
-              <ma14:wrappingTextBoxFlag xmlns:ma14="http://schemas.microsoft.com/office/mac/drawingml/2011/main" val="1"/>
-            </a:ext>
-          </a:extLst>
         </p:spPr>
         <p:txBody>
           <a:bodyPr>
@@ -2240,7 +2300,7 @@
       </p:sp>
       <p:sp>
         <p:nvSpPr>
-          <p:cNvPr id="45" name="Shape 45"/>
+          <p:cNvPr id="46" name="Shape 46"/>
           <p:cNvSpPr/>
           <p:nvPr>
             <p:ph type="title" idx="4294967295"/>
@@ -2254,11 +2314,6 @@
           <a:prstGeom prst="rect">
             <a:avLst/>
           </a:prstGeom>
-          <a:extLst>
-            <a:ext uri="{C572A759-6A51-4108-AA02-DFA0A04FC94B}">
-              <ma14:wrappingTextBoxFlag xmlns:ma14="http://schemas.microsoft.com/office/mac/drawingml/2011/main" val="1"/>
-            </a:ext>
-          </a:extLst>
         </p:spPr>
         <p:txBody>
           <a:bodyPr>
@@ -2273,6 +2328,456 @@
           </a:p>
         </p:txBody>
       </p:sp>
+      <p:grpSp>
+        <p:nvGrpSpPr>
+          <p:cNvPr id="53" name="Group 53"/>
+          <p:cNvGrpSpPr/>
+          <p:nvPr/>
+        </p:nvGrpSpPr>
+        <p:grpSpPr>
+          <a:xfrm>
+            <a:off x="1351025" y="986641"/>
+            <a:ext cx="6441950" cy="2606410"/>
+            <a:chOff x="0" y="0"/>
+            <a:chExt cx="6441948" cy="2606408"/>
+          </a:xfrm>
+        </p:grpSpPr>
+        <p:sp>
+          <p:nvSpPr>
+            <p:cNvPr id="47" name="Shape 47"/>
+            <p:cNvSpPr/>
+            <p:nvPr/>
+          </p:nvSpPr>
+          <p:spPr>
+            <a:xfrm>
+              <a:off x="4564580" y="768510"/>
+              <a:ext cx="1877369" cy="729182"/>
+            </a:xfrm>
+            <a:prstGeom prst="rect">
+              <a:avLst/>
+            </a:prstGeom>
+            <a:gradFill flip="none" rotWithShape="1">
+              <a:gsLst>
+                <a:gs pos="0">
+                  <a:srgbClr val="DCE3F6"/>
+                </a:gs>
+                <a:gs pos="35000">
+                  <a:srgbClr val="CFD9EF"/>
+                </a:gs>
+                <a:gs pos="100000">
+                  <a:srgbClr val="9EAFD6"/>
+                </a:gs>
+              </a:gsLst>
+              <a:lin ang="5400000" scaled="0"/>
+            </a:gradFill>
+            <a:ln w="9525" cap="flat">
+              <a:solidFill>
+                <a:srgbClr val="39639D"/>
+              </a:solidFill>
+              <a:prstDash val="solid"/>
+              <a:round/>
+            </a:ln>
+            <a:effectLst>
+              <a:outerShdw sx="100000" sy="100000" kx="0" ky="0" algn="b" rotWithShape="0" blurRad="50800" dist="38100" dir="5400000">
+                <a:srgbClr val="000000">
+                  <a:alpha val="34999"/>
+                </a:srgbClr>
+              </a:outerShdw>
+            </a:effectLst>
+            <a:extLst>
+              <a:ext uri="{C572A759-6A51-4108-AA02-DFA0A04FC94B}">
+                <ma14:wrappingTextBoxFlag xmlns:ma14="http://schemas.microsoft.com/office/mac/drawingml/2011/main" val="1"/>
+              </a:ext>
+            </a:extLst>
+          </p:spPr>
+          <p:txBody>
+            <a:bodyPr wrap="square" lIns="45719" tIns="45719" rIns="45719" bIns="45719" numCol="1" anchor="t">
+              <a:noAutofit/>
+            </a:bodyPr>
+            <a:lstStyle/>
+            <a:p>
+              <a:pPr>
+                <a:defRPr sz="1800">
+                  <a:latin typeface="Georgia"/>
+                  <a:ea typeface="Georgia"/>
+                  <a:cs typeface="Georgia"/>
+                  <a:sym typeface="Georgia"/>
+                </a:defRPr>
+              </a:pPr>
+              <a:r>
+                <a:t>Server</a:t>
+              </a:r>
+            </a:p>
+            <a:p>
+              <a:pPr>
+                <a:defRPr sz="1200">
+                  <a:latin typeface="Georgia"/>
+                  <a:ea typeface="Georgia"/>
+                  <a:cs typeface="Georgia"/>
+                  <a:sym typeface="Georgia"/>
+                </a:defRPr>
+              </a:pPr>
+              <a:r>
+                <a:t>Updating environment based on  new commands</a:t>
+              </a:r>
+            </a:p>
+          </p:txBody>
+        </p:sp>
+        <p:sp>
+          <p:nvSpPr>
+            <p:cNvPr id="48" name="Shape 48"/>
+            <p:cNvSpPr/>
+            <p:nvPr/>
+          </p:nvSpPr>
+          <p:spPr>
+            <a:xfrm>
+              <a:off x="0" y="768510"/>
+              <a:ext cx="1875768" cy="908436"/>
+            </a:xfrm>
+            <a:prstGeom prst="rect">
+              <a:avLst/>
+            </a:prstGeom>
+            <a:gradFill flip="none" rotWithShape="1">
+              <a:gsLst>
+                <a:gs pos="0">
+                  <a:srgbClr val="DCE3F6"/>
+                </a:gs>
+                <a:gs pos="35000">
+                  <a:srgbClr val="CFD9EF"/>
+                </a:gs>
+                <a:gs pos="100000">
+                  <a:srgbClr val="9EAFD6"/>
+                </a:gs>
+              </a:gsLst>
+              <a:lin ang="5400000" scaled="0"/>
+            </a:gradFill>
+            <a:ln w="9525" cap="flat">
+              <a:solidFill>
+                <a:srgbClr val="39639D"/>
+              </a:solidFill>
+              <a:prstDash val="solid"/>
+              <a:round/>
+            </a:ln>
+            <a:effectLst>
+              <a:outerShdw sx="100000" sy="100000" kx="0" ky="0" algn="b" rotWithShape="0" blurRad="50800" dist="38100" dir="5400000">
+                <a:srgbClr val="000000">
+                  <a:alpha val="34999"/>
+                </a:srgbClr>
+              </a:outerShdw>
+            </a:effectLst>
+            <a:extLst>
+              <a:ext uri="{C572A759-6A51-4108-AA02-DFA0A04FC94B}">
+                <ma14:wrappingTextBoxFlag xmlns:ma14="http://schemas.microsoft.com/office/mac/drawingml/2011/main" val="1"/>
+              </a:ext>
+            </a:extLst>
+          </p:spPr>
+          <p:txBody>
+            <a:bodyPr wrap="square" lIns="45719" tIns="45719" rIns="45719" bIns="45719" numCol="1" anchor="t">
+              <a:noAutofit/>
+            </a:bodyPr>
+            <a:lstStyle/>
+            <a:p>
+              <a:pPr>
+                <a:defRPr sz="1800">
+                  <a:latin typeface="Georgia"/>
+                  <a:ea typeface="Georgia"/>
+                  <a:cs typeface="Georgia"/>
+                  <a:sym typeface="Georgia"/>
+                </a:defRPr>
+              </a:pPr>
+              <a:r>
+                <a:t>Client</a:t>
+              </a:r>
+            </a:p>
+            <a:p>
+              <a:pPr>
+                <a:defRPr sz="1200">
+                  <a:latin typeface="Georgia"/>
+                  <a:ea typeface="Georgia"/>
+                  <a:cs typeface="Georgia"/>
+                  <a:sym typeface="Georgia"/>
+                </a:defRPr>
+              </a:pPr>
+              <a:r>
+                <a:t>Parsing new information and sending new command</a:t>
+              </a:r>
+            </a:p>
+          </p:txBody>
+        </p:sp>
+        <p:sp>
+          <p:nvSpPr>
+            <p:cNvPr id="49" name="Shape 49"/>
+            <p:cNvSpPr/>
+            <p:nvPr/>
+          </p:nvSpPr>
+          <p:spPr>
+            <a:xfrm>
+              <a:off x="800242" y="1980077"/>
+              <a:ext cx="4724630" cy="626332"/>
+            </a:xfrm>
+            <a:custGeom>
+              <a:avLst/>
+              <a:gdLst/>
+              <a:ahLst/>
+              <a:cxnLst>
+                <a:cxn ang="0">
+                  <a:pos x="wd2" y="hd2"/>
+                </a:cxn>
+                <a:cxn ang="5400000">
+                  <a:pos x="wd2" y="hd2"/>
+                </a:cxn>
+                <a:cxn ang="10800000">
+                  <a:pos x="wd2" y="hd2"/>
+                </a:cxn>
+                <a:cxn ang="16200000">
+                  <a:pos x="wd2" y="hd2"/>
+                </a:cxn>
+              </a:cxnLst>
+              <a:rect l="0" t="0" r="r" b="b"/>
+              <a:pathLst>
+                <a:path w="21600" h="21509" fill="norm" stroke="1" extrusionOk="0">
+                  <a:moveTo>
+                    <a:pt x="0" y="0"/>
+                  </a:moveTo>
+                  <a:cubicBezTo>
+                    <a:pt x="3878" y="10708"/>
+                    <a:pt x="7756" y="21416"/>
+                    <a:pt x="11356" y="21508"/>
+                  </a:cubicBezTo>
+                  <a:cubicBezTo>
+                    <a:pt x="14956" y="21600"/>
+                    <a:pt x="18278" y="11076"/>
+                    <a:pt x="21600" y="551"/>
+                  </a:cubicBezTo>
+                </a:path>
+              </a:pathLst>
+            </a:custGeom>
+            <a:noFill/>
+            <a:ln w="9525" cap="flat">
+              <a:solidFill>
+                <a:srgbClr val="474B78"/>
+              </a:solidFill>
+              <a:prstDash val="solid"/>
+              <a:round/>
+              <a:tailEnd type="stealth" w="med" len="med"/>
+            </a:ln>
+            <a:effectLst/>
+          </p:spPr>
+          <p:txBody>
+            <a:bodyPr wrap="square" lIns="45719" tIns="45719" rIns="45719" bIns="45719" numCol="1" anchor="ctr">
+              <a:noAutofit/>
+            </a:bodyPr>
+            <a:lstStyle/>
+            <a:p>
+              <a:pPr algn="ctr" defTabSz="455612">
+                <a:defRPr sz="3200">
+                  <a:solidFill>
+                    <a:srgbClr val="FFFFFF"/>
+                  </a:solidFill>
+                  <a:latin typeface="Gill Sans"/>
+                  <a:ea typeface="Gill Sans"/>
+                  <a:cs typeface="Gill Sans"/>
+                  <a:sym typeface="Gill Sans"/>
+                </a:defRPr>
+              </a:pPr>
+            </a:p>
+          </p:txBody>
+        </p:sp>
+        <p:sp>
+          <p:nvSpPr>
+            <p:cNvPr id="50" name="Shape 50"/>
+            <p:cNvSpPr/>
+            <p:nvPr/>
+          </p:nvSpPr>
+          <p:spPr>
+            <a:xfrm rot="10800000">
+              <a:off x="902673" y="-1"/>
+              <a:ext cx="4724630" cy="688488"/>
+            </a:xfrm>
+            <a:custGeom>
+              <a:avLst/>
+              <a:gdLst/>
+              <a:ahLst/>
+              <a:cxnLst>
+                <a:cxn ang="0">
+                  <a:pos x="wd2" y="hd2"/>
+                </a:cxn>
+                <a:cxn ang="5400000">
+                  <a:pos x="wd2" y="hd2"/>
+                </a:cxn>
+                <a:cxn ang="10800000">
+                  <a:pos x="wd2" y="hd2"/>
+                </a:cxn>
+                <a:cxn ang="16200000">
+                  <a:pos x="wd2" y="hd2"/>
+                </a:cxn>
+              </a:cxnLst>
+              <a:rect l="0" t="0" r="r" b="b"/>
+              <a:pathLst>
+                <a:path w="21600" h="21509" fill="norm" stroke="1" extrusionOk="0">
+                  <a:moveTo>
+                    <a:pt x="0" y="0"/>
+                  </a:moveTo>
+                  <a:cubicBezTo>
+                    <a:pt x="3878" y="10708"/>
+                    <a:pt x="7756" y="21416"/>
+                    <a:pt x="11356" y="21508"/>
+                  </a:cubicBezTo>
+                  <a:cubicBezTo>
+                    <a:pt x="14956" y="21600"/>
+                    <a:pt x="18278" y="11076"/>
+                    <a:pt x="21600" y="551"/>
+                  </a:cubicBezTo>
+                </a:path>
+              </a:pathLst>
+            </a:custGeom>
+            <a:noFill/>
+            <a:ln w="9525" cap="flat">
+              <a:solidFill>
+                <a:srgbClr val="474B78"/>
+              </a:solidFill>
+              <a:prstDash val="solid"/>
+              <a:round/>
+              <a:tailEnd type="stealth" w="med" len="med"/>
+            </a:ln>
+            <a:effectLst/>
+          </p:spPr>
+          <p:txBody>
+            <a:bodyPr wrap="square" lIns="45719" tIns="45719" rIns="45719" bIns="45719" numCol="1" anchor="ctr">
+              <a:noAutofit/>
+            </a:bodyPr>
+            <a:lstStyle/>
+            <a:p>
+              <a:pPr algn="ctr" defTabSz="455612">
+                <a:defRPr sz="3200">
+                  <a:solidFill>
+                    <a:srgbClr val="FFFFFF"/>
+                  </a:solidFill>
+                  <a:latin typeface="Gill Sans"/>
+                  <a:ea typeface="Gill Sans"/>
+                  <a:cs typeface="Gill Sans"/>
+                  <a:sym typeface="Gill Sans"/>
+                </a:defRPr>
+              </a:pPr>
+            </a:p>
+          </p:txBody>
+        </p:sp>
+        <p:sp>
+          <p:nvSpPr>
+            <p:cNvPr id="51" name="Shape 51"/>
+            <p:cNvSpPr/>
+            <p:nvPr/>
+          </p:nvSpPr>
+          <p:spPr>
+            <a:xfrm>
+              <a:off x="2016610" y="192336"/>
+              <a:ext cx="2415091" cy="335462"/>
+            </a:xfrm>
+            <a:prstGeom prst="rect">
+              <a:avLst/>
+            </a:prstGeom>
+            <a:noFill/>
+            <a:ln w="12700" cap="flat">
+              <a:noFill/>
+              <a:miter lim="400000"/>
+            </a:ln>
+            <a:effectLst/>
+            <a:extLst>
+              <a:ext uri="{C572A759-6A51-4108-AA02-DFA0A04FC94B}">
+                <ma14:wrappingTextBoxFlag xmlns:ma14="http://schemas.microsoft.com/office/mac/drawingml/2011/main" val="1"/>
+              </a:ext>
+            </a:extLst>
+          </p:spPr>
+          <p:txBody>
+            <a:bodyPr wrap="square" lIns="45719" tIns="45719" rIns="45719" bIns="45719" numCol="1" anchor="t">
+              <a:noAutofit/>
+            </a:bodyPr>
+            <a:lstStyle>
+              <a:lvl1pPr>
+                <a:defRPr sz="1600">
+                  <a:solidFill>
+                    <a:srgbClr val="3F1E25"/>
+                  </a:solidFill>
+                  <a:latin typeface="Georgia"/>
+                  <a:ea typeface="Georgia"/>
+                  <a:cs typeface="Georgia"/>
+                  <a:sym typeface="Georgia"/>
+                </a:defRPr>
+              </a:lvl1pPr>
+            </a:lstStyle>
+            <a:p>
+              <a:pPr/>
+              <a:r>
+                <a:t>Surrounding Information</a:t>
+              </a:r>
+            </a:p>
+          </p:txBody>
+        </p:sp>
+        <p:sp>
+          <p:nvSpPr>
+            <p:cNvPr id="52" name="Shape 52"/>
+            <p:cNvSpPr/>
+            <p:nvPr/>
+          </p:nvSpPr>
+          <p:spPr>
+            <a:xfrm>
+              <a:off x="2391123" y="2036093"/>
+              <a:ext cx="1648559" cy="365472"/>
+            </a:xfrm>
+            <a:prstGeom prst="rect">
+              <a:avLst/>
+            </a:prstGeom>
+            <a:noFill/>
+            <a:ln w="12700" cap="flat">
+              <a:noFill/>
+              <a:miter lim="400000"/>
+            </a:ln>
+            <a:effectLst/>
+            <a:extLst>
+              <a:ext uri="{C572A759-6A51-4108-AA02-DFA0A04FC94B}">
+                <ma14:wrappingTextBoxFlag xmlns:ma14="http://schemas.microsoft.com/office/mac/drawingml/2011/main" val="1"/>
+              </a:ext>
+            </a:extLst>
+          </p:spPr>
+          <p:txBody>
+            <a:bodyPr wrap="square" lIns="45719" tIns="45719" rIns="45719" bIns="45719" numCol="1" anchor="t">
+              <a:noAutofit/>
+            </a:bodyPr>
+            <a:lstStyle/>
+            <a:p>
+              <a:pPr>
+                <a:defRPr sz="1600">
+                  <a:solidFill>
+                    <a:srgbClr val="3F1E25"/>
+                  </a:solidFill>
+                  <a:latin typeface="Georgia"/>
+                  <a:ea typeface="Georgia"/>
+                  <a:cs typeface="Georgia"/>
+                  <a:sym typeface="Georgia"/>
+                </a:defRPr>
+              </a:pPr>
+              <a:r>
+                <a:t>New</a:t>
+              </a:r>
+              <a:r>
+                <a:rPr>
+                  <a:solidFill>
+                    <a:srgbClr val="000000"/>
+                  </a:solidFill>
+                  <a:latin typeface="Lucida Sans Unicode"/>
+                  <a:ea typeface="Lucida Sans Unicode"/>
+                  <a:cs typeface="Lucida Sans Unicode"/>
+                  <a:sym typeface="Lucida Sans Unicode"/>
+                </a:rPr>
+                <a:t> </a:t>
+              </a:r>
+              <a:r>
+                <a:t>Commands</a:t>
+              </a:r>
+            </a:p>
+          </p:txBody>
+        </p:sp>
+      </p:grpSp>
     </p:spTree>
   </p:cSld>
   <p:clrMapOvr>
@@ -2301,7 +2806,7 @@
       </p:grpSpPr>
       <p:sp>
         <p:nvSpPr>
-          <p:cNvPr id="47" name="Shape 47"/>
+          <p:cNvPr id="55" name="Shape 55"/>
           <p:cNvSpPr/>
           <p:nvPr>
             <p:ph type="sldNum" sz="quarter" idx="2"/>
@@ -2332,7 +2837,7 @@
       </p:sp>
       <p:pic>
         <p:nvPicPr>
-          <p:cNvPr id="48" name="w5bypxgm-1368615153.jpg"/>
+          <p:cNvPr id="56" name="w5bypxgm-1368615153.jpg"/>
           <p:cNvPicPr>
             <a:picLocks noChangeAspect="1"/>
           </p:cNvPicPr>
@@ -2348,8 +2853,8 @@
         </p:blipFill>
         <p:spPr>
           <a:xfrm>
-            <a:off x="1464042" y="1357332"/>
-            <a:ext cx="6215916" cy="4438611"/>
+            <a:off x="2118764" y="1001732"/>
+            <a:ext cx="4906472" cy="3503574"/>
           </a:xfrm>
           <a:prstGeom prst="rect">
             <a:avLst/>
@@ -2361,7 +2866,7 @@
       </p:pic>
       <p:sp>
         <p:nvSpPr>
-          <p:cNvPr id="49" name="Shape 49"/>
+          <p:cNvPr id="57" name="Shape 57"/>
           <p:cNvSpPr/>
           <p:nvPr>
             <p:ph type="title" idx="4294967295"/>
@@ -2375,11 +2880,6 @@
           <a:prstGeom prst="rect">
             <a:avLst/>
           </a:prstGeom>
-          <a:extLst>
-            <a:ext uri="{C572A759-6A51-4108-AA02-DFA0A04FC94B}">
-              <ma14:wrappingTextBoxFlag xmlns:ma14="http://schemas.microsoft.com/office/mac/drawingml/2011/main" val="1"/>
-            </a:ext>
-          </a:extLst>
         </p:spPr>
         <p:txBody>
           <a:bodyPr>
@@ -2389,7 +2889,47 @@
           <a:p>
             <a:pPr/>
             <a:r>
-              <a:t>Komplexität</a:t>
+              <a:t>Spielregeln</a:t>
+            </a:r>
+          </a:p>
+        </p:txBody>
+      </p:sp>
+      <p:sp>
+        <p:nvSpPr>
+          <p:cNvPr id="58" name="Shape 58"/>
+          <p:cNvSpPr/>
+          <p:nvPr>
+            <p:ph type="body" idx="4294967295"/>
+          </p:nvPr>
+        </p:nvSpPr>
+        <p:spPr>
+          <a:xfrm>
+            <a:off x="457200" y="4932362"/>
+            <a:ext cx="8229600" cy="4525963"/>
+          </a:xfrm>
+          <a:prstGeom prst="rect">
+            <a:avLst/>
+          </a:prstGeom>
+        </p:spPr>
+        <p:txBody>
+          <a:bodyPr>
+            <a:normAutofit fontScale="100000" lnSpcReduction="0"/>
+          </a:bodyPr>
+          <a:lstStyle/>
+          <a:p>
+            <a:pPr>
+              <a:buChar char="▪"/>
+            </a:pPr>
+            <a:r>
+              <a:t>Reduktion der Komplexität</a:t>
+            </a:r>
+          </a:p>
+          <a:p>
+            <a:pPr>
+              <a:buChar char="▪"/>
+            </a:pPr>
+            <a:r>
+              <a:t>Komplett beobachtbar</a:t>
             </a:r>
           </a:p>
         </p:txBody>

</xml_diff>